<commit_message>
uploaded youtube, added to git text
</commit_message>
<xml_diff>
--- a/MSDS696_FinalPresentation_JeremyBeard.pptx
+++ b/MSDS696_FinalPresentation_JeremyBeard.pptx
@@ -275,7 +275,7 @@
 <file path=ppt/revisionInfo.xml><?xml version="1.0" encoding="utf-8"?>
 <p1510:revInfo xmlns:a="http://schemas.openxmlformats.org/drawingml/2006/main" xmlns:r="http://schemas.openxmlformats.org/officeDocument/2006/relationships" xmlns:p1510="http://schemas.microsoft.com/office/powerpoint/2015/10/main">
   <p1510:revLst>
-    <p1510:client id="{05D82D89-3A92-456D-8D1D-474B08289771}" v="116" dt="2023-12-10T23:18:28.529"/>
+    <p1510:client id="{05D82D89-3A92-456D-8D1D-474B08289771}" v="117" dt="2023-12-11T00:10:21.248"/>
   </p1510:revLst>
 </p1510:revInfo>
 </file>
@@ -285,7 +285,7 @@
   <pc:docChgLst>
     <pc:chgData name="Jeremy Beard" userId="9676edfc3f3b3502" providerId="LiveId" clId="{05D82D89-3A92-456D-8D1D-474B08289771}"/>
     <pc:docChg chg="undo redo custSel addSld delSld modSld sldOrd modMainMaster">
-      <pc:chgData name="Jeremy Beard" userId="9676edfc3f3b3502" providerId="LiveId" clId="{05D82D89-3A92-456D-8D1D-474B08289771}" dt="2023-12-10T23:21:23.909" v="2762" actId="20577"/>
+      <pc:chgData name="Jeremy Beard" userId="9676edfc3f3b3502" providerId="LiveId" clId="{05D82D89-3A92-456D-8D1D-474B08289771}" dt="2023-12-11T00:10:26.522" v="2807" actId="20577"/>
       <pc:docMkLst>
         <pc:docMk/>
       </pc:docMkLst>
@@ -345,7 +345,7 @@
         </pc:spChg>
       </pc:sldChg>
       <pc:sldChg chg="addSp delSp modSp mod setBg delDesignElem">
-        <pc:chgData name="Jeremy Beard" userId="9676edfc3f3b3502" providerId="LiveId" clId="{05D82D89-3A92-456D-8D1D-474B08289771}" dt="2023-12-10T22:33:47.958" v="1135"/>
+        <pc:chgData name="Jeremy Beard" userId="9676edfc3f3b3502" providerId="LiveId" clId="{05D82D89-3A92-456D-8D1D-474B08289771}" dt="2023-12-11T00:10:26.522" v="2807" actId="20577"/>
         <pc:sldMkLst>
           <pc:docMk/>
           <pc:sldMk cId="3855531800" sldId="279"/>
@@ -359,7 +359,7 @@
           </ac:spMkLst>
         </pc:spChg>
         <pc:spChg chg="add mod">
-          <ac:chgData name="Jeremy Beard" userId="9676edfc3f3b3502" providerId="LiveId" clId="{05D82D89-3A92-456D-8D1D-474B08289771}" dt="2023-12-10T22:26:42.321" v="919" actId="27636"/>
+          <ac:chgData name="Jeremy Beard" userId="9676edfc3f3b3502" providerId="LiveId" clId="{05D82D89-3A92-456D-8D1D-474B08289771}" dt="2023-12-11T00:10:26.522" v="2807" actId="20577"/>
           <ac:spMkLst>
             <pc:docMk/>
             <pc:sldMk cId="3855531800" sldId="279"/>
@@ -407,8 +407,8 @@
           </ac:spMkLst>
         </pc:spChg>
       </pc:sldChg>
-      <pc:sldChg chg="addSp modSp mod">
-        <pc:chgData name="Jeremy Beard" userId="9676edfc3f3b3502" providerId="LiveId" clId="{05D82D89-3A92-456D-8D1D-474B08289771}" dt="2023-12-10T22:33:47.958" v="1135"/>
+      <pc:sldChg chg="addSp delSp modSp mod">
+        <pc:chgData name="Jeremy Beard" userId="9676edfc3f3b3502" providerId="LiveId" clId="{05D82D89-3A92-456D-8D1D-474B08289771}" dt="2023-12-10T23:59:01.193" v="2763" actId="478"/>
         <pc:sldMkLst>
           <pc:docMk/>
           <pc:sldMk cId="979622006" sldId="280"/>
@@ -437,8 +437,8 @@
             <ac:spMk id="4" creationId="{07342C16-C44F-F580-3AE6-B109752D0391}"/>
           </ac:spMkLst>
         </pc:spChg>
-        <pc:spChg chg="mod">
-          <ac:chgData name="Jeremy Beard" userId="9676edfc3f3b3502" providerId="LiveId" clId="{05D82D89-3A92-456D-8D1D-474B08289771}" dt="2023-12-10T22:33:47.958" v="1135"/>
+        <pc:spChg chg="del mod">
+          <ac:chgData name="Jeremy Beard" userId="9676edfc3f3b3502" providerId="LiveId" clId="{05D82D89-3A92-456D-8D1D-474B08289771}" dt="2023-12-10T23:59:01.193" v="2763" actId="478"/>
           <ac:spMkLst>
             <pc:docMk/>
             <pc:sldMk cId="979622006" sldId="280"/>
@@ -1950,7 +1950,7 @@
         </pc:picChg>
       </pc:sldChg>
       <pc:sldChg chg="addSp delSp modSp mod ord">
-        <pc:chgData name="Jeremy Beard" userId="9676edfc3f3b3502" providerId="LiveId" clId="{05D82D89-3A92-456D-8D1D-474B08289771}" dt="2023-12-10T23:21:23.909" v="2762" actId="20577"/>
+        <pc:chgData name="Jeremy Beard" userId="9676edfc3f3b3502" providerId="LiveId" clId="{05D82D89-3A92-456D-8D1D-474B08289771}" dt="2023-12-10T23:59:28.470" v="2769" actId="478"/>
         <pc:sldMkLst>
           <pc:docMk/>
           <pc:sldMk cId="94818171" sldId="292"/>
@@ -1971,8 +1971,8 @@
             <ac:spMk id="3" creationId="{2BE8FDE3-DBA4-6A04-C75D-E56FE92EF368}"/>
           </ac:spMkLst>
         </pc:spChg>
-        <pc:spChg chg="mod">
-          <ac:chgData name="Jeremy Beard" userId="9676edfc3f3b3502" providerId="LiveId" clId="{05D82D89-3A92-456D-8D1D-474B08289771}" dt="2023-12-10T22:33:47.958" v="1135"/>
+        <pc:spChg chg="del mod">
+          <ac:chgData name="Jeremy Beard" userId="9676edfc3f3b3502" providerId="LiveId" clId="{05D82D89-3A92-456D-8D1D-474B08289771}" dt="2023-12-10T23:59:28.470" v="2769" actId="478"/>
           <ac:spMkLst>
             <pc:docMk/>
             <pc:sldMk cId="94818171" sldId="292"/>
@@ -2051,8 +2051,8 @@
           </ac:spMkLst>
         </pc:spChg>
       </pc:sldChg>
-      <pc:sldChg chg="modSp add mod ord">
-        <pc:chgData name="Jeremy Beard" userId="9676edfc3f3b3502" providerId="LiveId" clId="{05D82D89-3A92-456D-8D1D-474B08289771}" dt="2023-12-10T22:33:47.958" v="1135"/>
+      <pc:sldChg chg="delSp modSp add mod ord">
+        <pc:chgData name="Jeremy Beard" userId="9676edfc3f3b3502" providerId="LiveId" clId="{05D82D89-3A92-456D-8D1D-474B08289771}" dt="2023-12-10T23:59:50.472" v="2775" actId="478"/>
         <pc:sldMkLst>
           <pc:docMk/>
           <pc:sldMk cId="316537765" sldId="294"/>
@@ -2073,8 +2073,8 @@
             <ac:spMk id="3" creationId="{2BE8FDE3-DBA4-6A04-C75D-E56FE92EF368}"/>
           </ac:spMkLst>
         </pc:spChg>
-        <pc:spChg chg="mod">
-          <ac:chgData name="Jeremy Beard" userId="9676edfc3f3b3502" providerId="LiveId" clId="{05D82D89-3A92-456D-8D1D-474B08289771}" dt="2023-12-10T22:33:47.958" v="1135"/>
+        <pc:spChg chg="del mod">
+          <ac:chgData name="Jeremy Beard" userId="9676edfc3f3b3502" providerId="LiveId" clId="{05D82D89-3A92-456D-8D1D-474B08289771}" dt="2023-12-10T23:59:50.472" v="2775" actId="478"/>
           <ac:spMkLst>
             <pc:docMk/>
             <pc:sldMk cId="316537765" sldId="294"/>
@@ -2245,11 +2245,19 @@
         </pc:sldMkLst>
       </pc:sldChg>
       <pc:sldChg chg="addSp delSp modSp new mod">
-        <pc:chgData name="Jeremy Beard" userId="9676edfc3f3b3502" providerId="LiveId" clId="{05D82D89-3A92-456D-8D1D-474B08289771}" dt="2023-12-10T22:40:20.228" v="1247" actId="1076"/>
+        <pc:chgData name="Jeremy Beard" userId="9676edfc3f3b3502" providerId="LiveId" clId="{05D82D89-3A92-456D-8D1D-474B08289771}" dt="2023-12-10T23:59:09.302" v="2764" actId="478"/>
         <pc:sldMkLst>
           <pc:docMk/>
           <pc:sldMk cId="3732293751" sldId="297"/>
         </pc:sldMkLst>
+        <pc:spChg chg="del">
+          <ac:chgData name="Jeremy Beard" userId="9676edfc3f3b3502" providerId="LiveId" clId="{05D82D89-3A92-456D-8D1D-474B08289771}" dt="2023-12-10T23:59:09.302" v="2764" actId="478"/>
+          <ac:spMkLst>
+            <pc:docMk/>
+            <pc:sldMk cId="3732293751" sldId="297"/>
+            <ac:spMk id="2" creationId="{583F0292-5AE0-09AE-2785-35A58EA5D051}"/>
+          </ac:spMkLst>
+        </pc:spChg>
         <pc:picChg chg="add del mod">
           <ac:chgData name="Jeremy Beard" userId="9676edfc3f3b3502" providerId="LiveId" clId="{05D82D89-3A92-456D-8D1D-474B08289771}" dt="2023-12-10T22:39:07.507" v="1224" actId="478"/>
           <ac:picMkLst>
@@ -2284,11 +2292,19 @@
         </pc:picChg>
       </pc:sldChg>
       <pc:sldChg chg="addSp delSp modSp add mod">
-        <pc:chgData name="Jeremy Beard" userId="9676edfc3f3b3502" providerId="LiveId" clId="{05D82D89-3A92-456D-8D1D-474B08289771}" dt="2023-12-10T22:38:37.918" v="1222" actId="962"/>
+        <pc:chgData name="Jeremy Beard" userId="9676edfc3f3b3502" providerId="LiveId" clId="{05D82D89-3A92-456D-8D1D-474B08289771}" dt="2023-12-10T23:59:19.135" v="2767" actId="478"/>
         <pc:sldMkLst>
           <pc:docMk/>
           <pc:sldMk cId="476466877" sldId="298"/>
         </pc:sldMkLst>
+        <pc:spChg chg="del">
+          <ac:chgData name="Jeremy Beard" userId="9676edfc3f3b3502" providerId="LiveId" clId="{05D82D89-3A92-456D-8D1D-474B08289771}" dt="2023-12-10T23:59:19.135" v="2767" actId="478"/>
+          <ac:spMkLst>
+            <pc:docMk/>
+            <pc:sldMk cId="476466877" sldId="298"/>
+            <ac:spMk id="2" creationId="{583F0292-5AE0-09AE-2785-35A58EA5D051}"/>
+          </ac:spMkLst>
+        </pc:spChg>
         <pc:picChg chg="del">
           <ac:chgData name="Jeremy Beard" userId="9676edfc3f3b3502" providerId="LiveId" clId="{05D82D89-3A92-456D-8D1D-474B08289771}" dt="2023-12-10T22:38:29.445" v="1218" actId="478"/>
           <ac:picMkLst>
@@ -2328,19 +2344,35 @@
           <pc:sldMk cId="258168006" sldId="299"/>
         </pc:sldMkLst>
       </pc:sldChg>
-      <pc:sldChg chg="add">
-        <pc:chgData name="Jeremy Beard" userId="9676edfc3f3b3502" providerId="LiveId" clId="{05D82D89-3A92-456D-8D1D-474B08289771}" dt="2023-12-10T22:39:04.435" v="1223" actId="2890"/>
+      <pc:sldChg chg="delSp add mod">
+        <pc:chgData name="Jeremy Beard" userId="9676edfc3f3b3502" providerId="LiveId" clId="{05D82D89-3A92-456D-8D1D-474B08289771}" dt="2023-12-10T23:59:12.785" v="2765" actId="478"/>
         <pc:sldMkLst>
           <pc:docMk/>
           <pc:sldMk cId="2826041157" sldId="299"/>
         </pc:sldMkLst>
+        <pc:spChg chg="del">
+          <ac:chgData name="Jeremy Beard" userId="9676edfc3f3b3502" providerId="LiveId" clId="{05D82D89-3A92-456D-8D1D-474B08289771}" dt="2023-12-10T23:59:12.785" v="2765" actId="478"/>
+          <ac:spMkLst>
+            <pc:docMk/>
+            <pc:sldMk cId="2826041157" sldId="299"/>
+            <ac:spMk id="2" creationId="{583F0292-5AE0-09AE-2785-35A58EA5D051}"/>
+          </ac:spMkLst>
+        </pc:spChg>
       </pc:sldChg>
       <pc:sldChg chg="addSp delSp modSp add mod">
-        <pc:chgData name="Jeremy Beard" userId="9676edfc3f3b3502" providerId="LiveId" clId="{05D82D89-3A92-456D-8D1D-474B08289771}" dt="2023-12-10T22:41:56.165" v="1255" actId="1076"/>
+        <pc:chgData name="Jeremy Beard" userId="9676edfc3f3b3502" providerId="LiveId" clId="{05D82D89-3A92-456D-8D1D-474B08289771}" dt="2023-12-10T23:59:16.286" v="2766" actId="478"/>
         <pc:sldMkLst>
           <pc:docMk/>
           <pc:sldMk cId="421798315" sldId="300"/>
         </pc:sldMkLst>
+        <pc:spChg chg="del">
+          <ac:chgData name="Jeremy Beard" userId="9676edfc3f3b3502" providerId="LiveId" clId="{05D82D89-3A92-456D-8D1D-474B08289771}" dt="2023-12-10T23:59:16.286" v="2766" actId="478"/>
+          <ac:spMkLst>
+            <pc:docMk/>
+            <pc:sldMk cId="421798315" sldId="300"/>
+            <ac:spMk id="2" creationId="{583F0292-5AE0-09AE-2785-35A58EA5D051}"/>
+          </ac:spMkLst>
+        </pc:spChg>
         <pc:picChg chg="del">
           <ac:chgData name="Jeremy Beard" userId="9676edfc3f3b3502" providerId="LiveId" clId="{05D82D89-3A92-456D-8D1D-474B08289771}" dt="2023-12-10T22:41:39.482" v="1249" actId="478"/>
           <ac:picMkLst>
@@ -2389,11 +2421,19 @@
         </pc:spChg>
       </pc:sldChg>
       <pc:sldChg chg="addSp delSp modSp add mod ord">
-        <pc:chgData name="Jeremy Beard" userId="9676edfc3f3b3502" providerId="LiveId" clId="{05D82D89-3A92-456D-8D1D-474B08289771}" dt="2023-12-10T22:42:59.413" v="1272" actId="962"/>
+        <pc:chgData name="Jeremy Beard" userId="9676edfc3f3b3502" providerId="LiveId" clId="{05D82D89-3A92-456D-8D1D-474B08289771}" dt="2023-12-10T23:59:24.102" v="2768" actId="478"/>
         <pc:sldMkLst>
           <pc:docMk/>
           <pc:sldMk cId="734086824" sldId="302"/>
         </pc:sldMkLst>
+        <pc:spChg chg="del">
+          <ac:chgData name="Jeremy Beard" userId="9676edfc3f3b3502" providerId="LiveId" clId="{05D82D89-3A92-456D-8D1D-474B08289771}" dt="2023-12-10T23:59:24.102" v="2768" actId="478"/>
+          <ac:spMkLst>
+            <pc:docMk/>
+            <pc:sldMk cId="734086824" sldId="302"/>
+            <ac:spMk id="2" creationId="{583F0292-5AE0-09AE-2785-35A58EA5D051}"/>
+          </ac:spMkLst>
+        </pc:spChg>
         <pc:picChg chg="add mod">
           <ac:chgData name="Jeremy Beard" userId="9676edfc3f3b3502" providerId="LiveId" clId="{05D82D89-3A92-456D-8D1D-474B08289771}" dt="2023-12-10T22:42:59.413" v="1272" actId="962"/>
           <ac:picMkLst>
@@ -2441,8 +2481,8 @@
           </ac:spMkLst>
         </pc:spChg>
       </pc:sldChg>
-      <pc:sldChg chg="modSp add mod ord">
-        <pc:chgData name="Jeremy Beard" userId="9676edfc3f3b3502" providerId="LiveId" clId="{05D82D89-3A92-456D-8D1D-474B08289771}" dt="2023-12-10T23:11:18.664" v="2219" actId="20577"/>
+      <pc:sldChg chg="delSp modSp add mod ord">
+        <pc:chgData name="Jeremy Beard" userId="9676edfc3f3b3502" providerId="LiveId" clId="{05D82D89-3A92-456D-8D1D-474B08289771}" dt="2023-12-10T23:59:39.574" v="2772" actId="478"/>
         <pc:sldMkLst>
           <pc:docMk/>
           <pc:sldMk cId="1943005970" sldId="305"/>
@@ -2455,19 +2495,35 @@
             <ac:spMk id="3" creationId="{2BE8FDE3-DBA4-6A04-C75D-E56FE92EF368}"/>
           </ac:spMkLst>
         </pc:spChg>
+        <pc:spChg chg="del">
+          <ac:chgData name="Jeremy Beard" userId="9676edfc3f3b3502" providerId="LiveId" clId="{05D82D89-3A92-456D-8D1D-474B08289771}" dt="2023-12-10T23:59:39.574" v="2772" actId="478"/>
+          <ac:spMkLst>
+            <pc:docMk/>
+            <pc:sldMk cId="1943005970" sldId="305"/>
+            <ac:spMk id="4" creationId="{D5BA2433-990B-A170-369A-3DF4A9B33BFA}"/>
+          </ac:spMkLst>
+        </pc:spChg>
       </pc:sldChg>
       <pc:sldChg chg="delSp modSp add mod">
-        <pc:chgData name="Jeremy Beard" userId="9676edfc3f3b3502" providerId="LiveId" clId="{05D82D89-3A92-456D-8D1D-474B08289771}" dt="2023-12-10T23:15:58.407" v="2610" actId="20577"/>
+        <pc:chgData name="Jeremy Beard" userId="9676edfc3f3b3502" providerId="LiveId" clId="{05D82D89-3A92-456D-8D1D-474B08289771}" dt="2023-12-11T00:02:22.535" v="2791" actId="20577"/>
         <pc:sldMkLst>
           <pc:docMk/>
           <pc:sldMk cId="4278549494" sldId="306"/>
         </pc:sldMkLst>
         <pc:spChg chg="mod">
-          <ac:chgData name="Jeremy Beard" userId="9676edfc3f3b3502" providerId="LiveId" clId="{05D82D89-3A92-456D-8D1D-474B08289771}" dt="2023-12-10T23:15:58.407" v="2610" actId="20577"/>
+          <ac:chgData name="Jeremy Beard" userId="9676edfc3f3b3502" providerId="LiveId" clId="{05D82D89-3A92-456D-8D1D-474B08289771}" dt="2023-12-11T00:02:22.535" v="2791" actId="20577"/>
           <ac:spMkLst>
             <pc:docMk/>
             <pc:sldMk cId="4278549494" sldId="306"/>
             <ac:spMk id="3" creationId="{2BE8FDE3-DBA4-6A04-C75D-E56FE92EF368}"/>
+          </ac:spMkLst>
+        </pc:spChg>
+        <pc:spChg chg="del mod">
+          <ac:chgData name="Jeremy Beard" userId="9676edfc3f3b3502" providerId="LiveId" clId="{05D82D89-3A92-456D-8D1D-474B08289771}" dt="2023-12-10T23:59:47.488" v="2774" actId="478"/>
+          <ac:spMkLst>
+            <pc:docMk/>
+            <pc:sldMk cId="4278549494" sldId="306"/>
+            <ac:spMk id="4" creationId="{D5BA2433-990B-A170-369A-3DF4A9B33BFA}"/>
           </ac:spMkLst>
         </pc:spChg>
         <pc:picChg chg="del">
@@ -2480,7 +2536,7 @@
         </pc:picChg>
       </pc:sldChg>
       <pc:sldChg chg="addSp delSp modSp add mod">
-        <pc:chgData name="Jeremy Beard" userId="9676edfc3f3b3502" providerId="LiveId" clId="{05D82D89-3A92-456D-8D1D-474B08289771}" dt="2023-12-10T23:07:54.009" v="1876" actId="20577"/>
+        <pc:chgData name="Jeremy Beard" userId="9676edfc3f3b3502" providerId="LiveId" clId="{05D82D89-3A92-456D-8D1D-474B08289771}" dt="2023-12-10T23:59:36.511" v="2771" actId="478"/>
         <pc:sldMkLst>
           <pc:docMk/>
           <pc:sldMk cId="2047083352" sldId="307"/>
@@ -2493,6 +2549,14 @@
             <ac:spMk id="3" creationId="{2BE8FDE3-DBA4-6A04-C75D-E56FE92EF368}"/>
           </ac:spMkLst>
         </pc:spChg>
+        <pc:spChg chg="del">
+          <ac:chgData name="Jeremy Beard" userId="9676edfc3f3b3502" providerId="LiveId" clId="{05D82D89-3A92-456D-8D1D-474B08289771}" dt="2023-12-10T23:59:36.511" v="2771" actId="478"/>
+          <ac:spMkLst>
+            <pc:docMk/>
+            <pc:sldMk cId="2047083352" sldId="307"/>
+            <ac:spMk id="4" creationId="{D5BA2433-990B-A170-369A-3DF4A9B33BFA}"/>
+          </ac:spMkLst>
+        </pc:spChg>
         <pc:grpChg chg="add mod">
           <ac:chgData name="Jeremy Beard" userId="9676edfc3f3b3502" providerId="LiveId" clId="{05D82D89-3A92-456D-8D1D-474B08289771}" dt="2023-12-10T23:06:20.938" v="1766" actId="1076"/>
           <ac:grpSpMkLst>
@@ -2535,7 +2599,7 @@
         </pc:picChg>
       </pc:sldChg>
       <pc:sldChg chg="addSp delSp modSp add mod ord">
-        <pc:chgData name="Jeremy Beard" userId="9676edfc3f3b3502" providerId="LiveId" clId="{05D82D89-3A92-456D-8D1D-474B08289771}" dt="2023-12-10T23:00:22.130" v="1692" actId="113"/>
+        <pc:chgData name="Jeremy Beard" userId="9676edfc3f3b3502" providerId="LiveId" clId="{05D82D89-3A92-456D-8D1D-474B08289771}" dt="2023-12-11T00:02:44.103" v="2804" actId="20577"/>
         <pc:sldMkLst>
           <pc:docMk/>
           <pc:sldMk cId="2312109399" sldId="308"/>
@@ -2548,6 +2612,14 @@
             <ac:spMk id="3" creationId="{2BE8FDE3-DBA4-6A04-C75D-E56FE92EF368}"/>
           </ac:spMkLst>
         </pc:spChg>
+        <pc:spChg chg="del">
+          <ac:chgData name="Jeremy Beard" userId="9676edfc3f3b3502" providerId="LiveId" clId="{05D82D89-3A92-456D-8D1D-474B08289771}" dt="2023-12-10T23:59:33.229" v="2770" actId="478"/>
+          <ac:spMkLst>
+            <pc:docMk/>
+            <pc:sldMk cId="2312109399" sldId="308"/>
+            <ac:spMk id="4" creationId="{D5BA2433-990B-A170-369A-3DF4A9B33BFA}"/>
+          </ac:spMkLst>
+        </pc:spChg>
         <pc:spChg chg="add del mod">
           <ac:chgData name="Jeremy Beard" userId="9676edfc3f3b3502" providerId="LiveId" clId="{05D82D89-3A92-456D-8D1D-474B08289771}" dt="2023-12-10T22:57:37.503" v="1641" actId="478"/>
           <ac:spMkLst>
@@ -2557,7 +2629,7 @@
           </ac:spMkLst>
         </pc:spChg>
         <pc:spChg chg="add mod">
-          <ac:chgData name="Jeremy Beard" userId="9676edfc3f3b3502" providerId="LiveId" clId="{05D82D89-3A92-456D-8D1D-474B08289771}" dt="2023-12-10T23:00:22.130" v="1692" actId="113"/>
+          <ac:chgData name="Jeremy Beard" userId="9676edfc3f3b3502" providerId="LiveId" clId="{05D82D89-3A92-456D-8D1D-474B08289771}" dt="2023-12-11T00:02:44.103" v="2804" actId="20577"/>
           <ac:spMkLst>
             <pc:docMk/>
             <pc:sldMk cId="2312109399" sldId="308"/>
@@ -3062,7 +3134,7 @@
           <a:effectLst/>
           <a:extLst>
             <a:ext uri="{91240B29-F687-4f45-9708-019B960494DF}">
-              <a14:hiddenLine xmlns="" xmlns:a14="http://schemas.microsoft.com/office/drawing/2010/main" w="9525">
+              <a14:hiddenLine xmlns:a14="http://schemas.microsoft.com/office/drawing/2010/main" xmlns="" w="9525">
                 <a:solidFill>
                   <a:srgbClr val="000000"/>
                 </a:solidFill>
@@ -4821,7 +4893,7 @@
           <a:ln/>
           <a:extLst>
             <a:ext uri="{91240B29-F687-4f45-9708-019B960494DF}">
-              <a14:hiddenLine xmlns="" xmlns:a14="http://schemas.microsoft.com/office/drawing/2010/main" w="9525">
+              <a14:hiddenLine xmlns:a14="http://schemas.microsoft.com/office/drawing/2010/main" xmlns="" w="9525">
                 <a:solidFill>
                   <a:srgbClr val="000000"/>
                 </a:solidFill>
@@ -5103,7 +5175,7 @@
           <a:ln/>
           <a:extLst>
             <a:ext uri="{91240B29-F687-4f45-9708-019B960494DF}">
-              <a14:hiddenLine xmlns="" xmlns:a14="http://schemas.microsoft.com/office/drawing/2010/main" w="9525">
+              <a14:hiddenLine xmlns:a14="http://schemas.microsoft.com/office/drawing/2010/main" xmlns="" w="9525">
                 <a:solidFill>
                   <a:srgbClr val="000000"/>
                 </a:solidFill>
@@ -11500,7 +11572,7 @@
           <a:ln/>
           <a:extLst>
             <a:ext uri="{91240B29-F687-4f45-9708-019B960494DF}">
-              <a14:hiddenLine xmlns="" xmlns:a14="http://schemas.microsoft.com/office/drawing/2010/main" w="9525">
+              <a14:hiddenLine xmlns:a14="http://schemas.microsoft.com/office/drawing/2010/main" xmlns="" w="9525">
                 <a:solidFill>
                   <a:srgbClr val="000000"/>
                 </a:solidFill>
@@ -12884,7 +12956,7 @@
           <a:ln/>
           <a:extLst>
             <a:ext uri="{91240B29-F687-4f45-9708-019B960494DF}">
-              <a14:hiddenLine xmlns="" xmlns:a14="http://schemas.microsoft.com/office/drawing/2010/main" w="9525">
+              <a14:hiddenLine xmlns:a14="http://schemas.microsoft.com/office/drawing/2010/main" xmlns="" w="9525">
                 <a:solidFill>
                   <a:srgbClr val="000000"/>
                 </a:solidFill>
@@ -13230,7 +13302,7 @@
           <a:ln/>
           <a:extLst>
             <a:ext uri="{91240B29-F687-4f45-9708-019B960494DF}">
-              <a14:hiddenLine xmlns="" xmlns:a14="http://schemas.microsoft.com/office/drawing/2010/main" w="9525">
+              <a14:hiddenLine xmlns:a14="http://schemas.microsoft.com/office/drawing/2010/main" xmlns="" w="9525">
                 <a:solidFill>
                   <a:srgbClr val="000000"/>
                 </a:solidFill>
@@ -13972,7 +14044,7 @@
           <a:ln/>
           <a:extLst>
             <a:ext uri="{91240B29-F687-4f45-9708-019B960494DF}">
-              <a14:hiddenLine xmlns="" xmlns:a14="http://schemas.microsoft.com/office/drawing/2010/main" w="9525">
+              <a14:hiddenLine xmlns:a14="http://schemas.microsoft.com/office/drawing/2010/main" xmlns="" w="9525">
                 <a:solidFill>
                   <a:srgbClr val="000000"/>
                 </a:solidFill>
@@ -18255,7 +18327,7 @@
           <a:ln/>
           <a:extLst>
             <a:ext uri="{91240B29-F687-4f45-9708-019B960494DF}">
-              <a14:hiddenLine xmlns="" xmlns:a14="http://schemas.microsoft.com/office/drawing/2010/main" w="9525">
+              <a14:hiddenLine xmlns:a14="http://schemas.microsoft.com/office/drawing/2010/main" xmlns="" w="9525">
                 <a:solidFill>
                   <a:srgbClr val="000000"/>
                 </a:solidFill>
@@ -20776,7 +20848,7 @@
           <a:effectLst/>
           <a:extLst>
             <a:ext uri="{91240B29-F687-4f45-9708-019B960494DF}">
-              <a14:hiddenLine xmlns:a16="http://schemas.microsoft.com/office/drawing/2014/main" xmlns:p14="http://schemas.microsoft.com/office/powerpoint/2010/main" xmlns:a14="http://schemas.microsoft.com/office/drawing/2010/main" xmlns="" w="9525">
+              <a14:hiddenLine xmlns="" xmlns:a14="http://schemas.microsoft.com/office/drawing/2010/main" xmlns:p14="http://schemas.microsoft.com/office/powerpoint/2010/main" xmlns:a16="http://schemas.microsoft.com/office/drawing/2014/main" w="9525">
                 <a:solidFill>
                   <a:srgbClr val="000000"/>
                 </a:solidFill>
@@ -20931,35 +21003,6 @@
           <a:chExt cx="0" cy="0"/>
         </a:xfrm>
       </p:grpSpPr>
-      <p:sp>
-        <p:nvSpPr>
-          <p:cNvPr id="2" name="Footer Placeholder 1">
-            <a:extLst>
-              <a:ext uri="{FF2B5EF4-FFF2-40B4-BE49-F238E27FC236}">
-                <a16:creationId xmlns:a16="http://schemas.microsoft.com/office/drawing/2014/main" id="{583F0292-5AE0-09AE-2785-35A58EA5D051}"/>
-              </a:ext>
-            </a:extLst>
-          </p:cNvPr>
-          <p:cNvSpPr>
-            <a:spLocks noGrp="1"/>
-          </p:cNvSpPr>
-          <p:nvPr>
-            <p:ph type="ftr" sz="quarter" idx="11"/>
-          </p:nvPr>
-        </p:nvSpPr>
-        <p:spPr/>
-        <p:txBody>
-          <a:bodyPr/>
-          <a:lstStyle/>
-          <a:p>
-            <a:r>
-              <a:rPr lang="en-US"/>
-              <a:t>Presentation title</a:t>
-            </a:r>
-            <a:endParaRPr lang="en-US" dirty="0"/>
-          </a:p>
-        </p:txBody>
-      </p:sp>
       <p:sp>
         <p:nvSpPr>
           <p:cNvPr id="3" name="Slide Number Placeholder 2">
@@ -21140,35 +21183,6 @@
       </p:grpSpPr>
       <p:sp>
         <p:nvSpPr>
-          <p:cNvPr id="2" name="Footer Placeholder 1">
-            <a:extLst>
-              <a:ext uri="{FF2B5EF4-FFF2-40B4-BE49-F238E27FC236}">
-                <a16:creationId xmlns:a16="http://schemas.microsoft.com/office/drawing/2014/main" id="{583F0292-5AE0-09AE-2785-35A58EA5D051}"/>
-              </a:ext>
-            </a:extLst>
-          </p:cNvPr>
-          <p:cNvSpPr>
-            <a:spLocks noGrp="1"/>
-          </p:cNvSpPr>
-          <p:nvPr>
-            <p:ph type="ftr" sz="quarter" idx="11"/>
-          </p:nvPr>
-        </p:nvSpPr>
-        <p:spPr/>
-        <p:txBody>
-          <a:bodyPr/>
-          <a:lstStyle/>
-          <a:p>
-            <a:r>
-              <a:rPr lang="en-US"/>
-              <a:t>Presentation title</a:t>
-            </a:r>
-            <a:endParaRPr lang="en-US" dirty="0"/>
-          </a:p>
-        </p:txBody>
-      </p:sp>
-      <p:sp>
-        <p:nvSpPr>
           <p:cNvPr id="3" name="Slide Number Placeholder 2">
             <a:extLst>
               <a:ext uri="{FF2B5EF4-FFF2-40B4-BE49-F238E27FC236}">
@@ -21483,35 +21497,6 @@
       </p:sp>
       <p:sp>
         <p:nvSpPr>
-          <p:cNvPr id="4" name="Footer Placeholder 3">
-            <a:extLst>
-              <a:ext uri="{FF2B5EF4-FFF2-40B4-BE49-F238E27FC236}">
-                <a16:creationId xmlns:a16="http://schemas.microsoft.com/office/drawing/2014/main" id="{D5BA2433-990B-A170-369A-3DF4A9B33BFA}"/>
-              </a:ext>
-            </a:extLst>
-          </p:cNvPr>
-          <p:cNvSpPr>
-            <a:spLocks noGrp="1"/>
-          </p:cNvSpPr>
-          <p:nvPr>
-            <p:ph type="ftr" sz="quarter" idx="11"/>
-          </p:nvPr>
-        </p:nvSpPr>
-        <p:spPr/>
-        <p:txBody>
-          <a:bodyPr/>
-          <a:lstStyle/>
-          <a:p>
-            <a:r>
-              <a:rPr lang="en-US"/>
-              <a:t>Presentation title</a:t>
-            </a:r>
-            <a:endParaRPr lang="en-US" dirty="0"/>
-          </a:p>
-        </p:txBody>
-      </p:sp>
-      <p:sp>
-        <p:nvSpPr>
           <p:cNvPr id="5" name="Slide Number Placeholder 4">
             <a:extLst>
               <a:ext uri="{FF2B5EF4-FFF2-40B4-BE49-F238E27FC236}">
@@ -21690,34 +21675,6 @@
             <a:r>
               <a:rPr lang="en-US" dirty="0"/>
               <a:t>ML Model Results</a:t>
-            </a:r>
-          </a:p>
-        </p:txBody>
-      </p:sp>
-      <p:sp>
-        <p:nvSpPr>
-          <p:cNvPr id="4" name="Footer Placeholder 3">
-            <a:extLst>
-              <a:ext uri="{FF2B5EF4-FFF2-40B4-BE49-F238E27FC236}">
-                <a16:creationId xmlns:a16="http://schemas.microsoft.com/office/drawing/2014/main" id="{D5BA2433-990B-A170-369A-3DF4A9B33BFA}"/>
-              </a:ext>
-            </a:extLst>
-          </p:cNvPr>
-          <p:cNvSpPr>
-            <a:spLocks noGrp="1"/>
-          </p:cNvSpPr>
-          <p:nvPr>
-            <p:ph type="ftr" sz="quarter" idx="11"/>
-          </p:nvPr>
-        </p:nvSpPr>
-        <p:spPr/>
-        <p:txBody>
-          <a:bodyPr/>
-          <a:lstStyle/>
-          <a:p>
-            <a:r>
-              <a:rPr lang="en-US" dirty="0"/>
-              <a:t>Presentation title</a:t>
             </a:r>
           </a:p>
         </p:txBody>
@@ -21810,7 +21767,7 @@
           <a:p>
             <a:r>
               <a:rPr lang="en-US" b="1" dirty="0"/>
-              <a:t>Mean Average Error: </a:t>
+              <a:t>Mean Absolute Error: </a:t>
             </a:r>
             <a:r>
               <a:rPr lang="en-US" dirty="0"/>
@@ -21957,35 +21914,6 @@
               <a:rPr lang="en-US" u="sng" dirty="0"/>
               <a:t>Extra Trees</a:t>
             </a:r>
-          </a:p>
-        </p:txBody>
-      </p:sp>
-      <p:sp>
-        <p:nvSpPr>
-          <p:cNvPr id="4" name="Footer Placeholder 3">
-            <a:extLst>
-              <a:ext uri="{FF2B5EF4-FFF2-40B4-BE49-F238E27FC236}">
-                <a16:creationId xmlns:a16="http://schemas.microsoft.com/office/drawing/2014/main" id="{D5BA2433-990B-A170-369A-3DF4A9B33BFA}"/>
-              </a:ext>
-            </a:extLst>
-          </p:cNvPr>
-          <p:cNvSpPr>
-            <a:spLocks noGrp="1"/>
-          </p:cNvSpPr>
-          <p:nvPr>
-            <p:ph type="ftr" sz="quarter" idx="11"/>
-          </p:nvPr>
-        </p:nvSpPr>
-        <p:spPr/>
-        <p:txBody>
-          <a:bodyPr/>
-          <a:lstStyle/>
-          <a:p>
-            <a:r>
-              <a:rPr lang="en-US"/>
-              <a:t>Presentation title</a:t>
-            </a:r>
-            <a:endParaRPr lang="en-US" dirty="0"/>
           </a:p>
         </p:txBody>
       </p:sp>
@@ -22259,35 +22187,6 @@
       </p:sp>
       <p:sp>
         <p:nvSpPr>
-          <p:cNvPr id="4" name="Footer Placeholder 3">
-            <a:extLst>
-              <a:ext uri="{FF2B5EF4-FFF2-40B4-BE49-F238E27FC236}">
-                <a16:creationId xmlns:a16="http://schemas.microsoft.com/office/drawing/2014/main" id="{D5BA2433-990B-A170-369A-3DF4A9B33BFA}"/>
-              </a:ext>
-            </a:extLst>
-          </p:cNvPr>
-          <p:cNvSpPr>
-            <a:spLocks noGrp="1"/>
-          </p:cNvSpPr>
-          <p:nvPr>
-            <p:ph type="ftr" sz="quarter" idx="11"/>
-          </p:nvPr>
-        </p:nvSpPr>
-        <p:spPr/>
-        <p:txBody>
-          <a:bodyPr/>
-          <a:lstStyle/>
-          <a:p>
-            <a:r>
-              <a:rPr lang="en-US"/>
-              <a:t>Presentation title</a:t>
-            </a:r>
-            <a:endParaRPr lang="en-US" dirty="0"/>
-          </a:p>
-        </p:txBody>
-      </p:sp>
-      <p:sp>
-        <p:nvSpPr>
           <p:cNvPr id="5" name="Slide Number Placeholder 4">
             <a:extLst>
               <a:ext uri="{FF2B5EF4-FFF2-40B4-BE49-F238E27FC236}">
@@ -22397,7 +22296,7 @@
           <a:p>
             <a:r>
               <a:rPr lang="en-US" dirty="0"/>
-              <a:t>Using the Booking.com API, we were able to create a model with $22 Mean Average Error prediction</a:t>
+              <a:t>Using the Booking.com API, we were able to create a model with $22 Mean Absolute Error prediction</a:t>
             </a:r>
           </a:p>
           <a:p>
@@ -22416,7 +22315,7 @@
             <a:pPr lvl="1"/>
             <a:r>
               <a:rPr lang="en-US" dirty="0"/>
-              <a:t>Using Ordinate datetime </a:t>
+              <a:t>Using Ordinal datetime </a:t>
             </a:r>
           </a:p>
           <a:p>
@@ -22426,35 +22325,6 @@
             </a:r>
           </a:p>
           <a:p>
-            <a:endParaRPr lang="en-US" dirty="0"/>
-          </a:p>
-        </p:txBody>
-      </p:sp>
-      <p:sp>
-        <p:nvSpPr>
-          <p:cNvPr id="4" name="Footer Placeholder 3">
-            <a:extLst>
-              <a:ext uri="{FF2B5EF4-FFF2-40B4-BE49-F238E27FC236}">
-                <a16:creationId xmlns:a16="http://schemas.microsoft.com/office/drawing/2014/main" id="{D5BA2433-990B-A170-369A-3DF4A9B33BFA}"/>
-              </a:ext>
-            </a:extLst>
-          </p:cNvPr>
-          <p:cNvSpPr>
-            <a:spLocks noGrp="1"/>
-          </p:cNvSpPr>
-          <p:nvPr>
-            <p:ph type="ftr" sz="quarter" idx="11"/>
-          </p:nvPr>
-        </p:nvSpPr>
-        <p:spPr/>
-        <p:txBody>
-          <a:bodyPr/>
-          <a:lstStyle/>
-          <a:p>
-            <a:r>
-              <a:rPr lang="en-US"/>
-              <a:t>Presentation title</a:t>
-            </a:r>
             <a:endParaRPr lang="en-US" dirty="0"/>
           </a:p>
         </p:txBody>
@@ -22767,16 +22637,10 @@
               <a:rPr lang="en-US" dirty="0">
                 <a:hlinkClick r:id="rId3"/>
               </a:rPr>
-              <a:t>https://booking-com13.p.rapidapi.com/flights</a:t>
+              <a:t>https://booking-com13.p.rapidapi.com/flights/one-way</a:t>
             </a:r>
             <a:r>
-              <a:rPr lang="en-US">
-                <a:hlinkClick r:id="rId3"/>
-              </a:rPr>
-              <a:t>/one-way</a:t>
-            </a:r>
-            <a:r>
-              <a:rPr lang="en-US" sz="1000"/>
+              <a:rPr lang="en-US" sz="1000" dirty="0"/>
               <a:t> </a:t>
             </a:r>
             <a:endParaRPr lang="en-US" dirty="0"/>
@@ -22974,35 +22838,6 @@
             </a:r>
           </a:p>
           <a:p>
-            <a:endParaRPr lang="en-US" dirty="0"/>
-          </a:p>
-        </p:txBody>
-      </p:sp>
-      <p:sp>
-        <p:nvSpPr>
-          <p:cNvPr id="4" name="Footer Placeholder 3">
-            <a:extLst>
-              <a:ext uri="{FF2B5EF4-FFF2-40B4-BE49-F238E27FC236}">
-                <a16:creationId xmlns:a16="http://schemas.microsoft.com/office/drawing/2014/main" id="{D5BA2433-990B-A170-369A-3DF4A9B33BFA}"/>
-              </a:ext>
-            </a:extLst>
-          </p:cNvPr>
-          <p:cNvSpPr>
-            <a:spLocks noGrp="1"/>
-          </p:cNvSpPr>
-          <p:nvPr>
-            <p:ph type="ftr" sz="quarter" idx="11"/>
-          </p:nvPr>
-        </p:nvSpPr>
-        <p:spPr/>
-        <p:txBody>
-          <a:bodyPr/>
-          <a:lstStyle/>
-          <a:p>
-            <a:r>
-              <a:rPr lang="en-US"/>
-              <a:t>Presentation title</a:t>
-            </a:r>
             <a:endParaRPr lang="en-US" dirty="0"/>
           </a:p>
         </p:txBody>
@@ -23372,7 +23207,7 @@
           <a:effectLst/>
           <a:extLst>
             <a:ext uri="{91240B29-F687-4f45-9708-019B960494DF}">
-              <a14:hiddenLine xmlns:a16="http://schemas.microsoft.com/office/drawing/2014/main" xmlns:p14="http://schemas.microsoft.com/office/powerpoint/2010/main" xmlns:a14="http://schemas.microsoft.com/office/drawing/2010/main" xmlns="" w="9525">
+              <a14:hiddenLine xmlns="" xmlns:a14="http://schemas.microsoft.com/office/drawing/2010/main" xmlns:p14="http://schemas.microsoft.com/office/powerpoint/2010/main" xmlns:a16="http://schemas.microsoft.com/office/drawing/2014/main" w="9525">
                 <a:solidFill>
                   <a:srgbClr val="000000"/>
                 </a:solidFill>
@@ -23893,7 +23728,7 @@
           <a:ln/>
           <a:extLst>
             <a:ext uri="{91240B29-F687-4f45-9708-019B960494DF}">
-              <a14:hiddenLine xmlns:a16="http://schemas.microsoft.com/office/drawing/2014/main" xmlns:a14="http://schemas.microsoft.com/office/drawing/2010/main" xmlns="" w="9525">
+              <a14:hiddenLine xmlns="" xmlns:a14="http://schemas.microsoft.com/office/drawing/2010/main" xmlns:a16="http://schemas.microsoft.com/office/drawing/2014/main" w="9525">
                 <a:solidFill>
                   <a:srgbClr val="000000"/>
                 </a:solidFill>
@@ -24199,7 +24034,7 @@
           <a:effectLst/>
           <a:extLst>
             <a:ext uri="{91240B29-F687-4f45-9708-019B960494DF}">
-              <a14:hiddenLine xmlns:a16="http://schemas.microsoft.com/office/drawing/2014/main" xmlns:p14="http://schemas.microsoft.com/office/powerpoint/2010/main" xmlns:a14="http://schemas.microsoft.com/office/drawing/2010/main" xmlns="" w="9525">
+              <a14:hiddenLine xmlns="" xmlns:a14="http://schemas.microsoft.com/office/drawing/2010/main" xmlns:p14="http://schemas.microsoft.com/office/powerpoint/2010/main" xmlns:a16="http://schemas.microsoft.com/office/drawing/2014/main" w="9525">
                 <a:solidFill>
                   <a:srgbClr val="000000"/>
                 </a:solidFill>
@@ -24370,7 +24205,7 @@
             </a:pPr>
             <a:r>
               <a:rPr lang="en-US" dirty="0"/>
-              <a:t> Conclusions</a:t>
+              <a:t> Future Work</a:t>
             </a:r>
           </a:p>
           <a:p>
@@ -24383,7 +24218,7 @@
             </a:pPr>
             <a:r>
               <a:rPr lang="en-US" dirty="0"/>
-              <a:t> Future Work</a:t>
+              <a:t> Conclusions</a:t>
             </a:r>
           </a:p>
           <a:p>
@@ -24495,35 +24330,6 @@
               <a:rPr lang="en-US" dirty="0"/>
               <a:t>Solution will enable the creation of a precise predictive model and empower stakeholders with valuable insights for informed decision-making in the airline industry.</a:t>
             </a:r>
-          </a:p>
-        </p:txBody>
-      </p:sp>
-      <p:sp>
-        <p:nvSpPr>
-          <p:cNvPr id="14" name="Footer Placeholder 13">
-            <a:extLst>
-              <a:ext uri="{FF2B5EF4-FFF2-40B4-BE49-F238E27FC236}">
-                <a16:creationId xmlns:a16="http://schemas.microsoft.com/office/drawing/2014/main" id="{03571BF2-FCCE-E7A0-736D-9168D2BBFF63}"/>
-              </a:ext>
-            </a:extLst>
-          </p:cNvPr>
-          <p:cNvSpPr>
-            <a:spLocks noGrp="1"/>
-          </p:cNvSpPr>
-          <p:nvPr>
-            <p:ph type="ftr" sz="quarter" idx="11"/>
-          </p:nvPr>
-        </p:nvSpPr>
-        <p:spPr/>
-        <p:txBody>
-          <a:bodyPr/>
-          <a:lstStyle/>
-          <a:p>
-            <a:r>
-              <a:rPr lang="en-US"/>
-              <a:t>Presentation title</a:t>
-            </a:r>
-            <a:endParaRPr lang="en-US" dirty="0"/>
           </a:p>
         </p:txBody>
       </p:sp>
@@ -24924,7 +24730,7 @@
           <a:ln/>
           <a:extLst>
             <a:ext uri="{91240B29-F687-4f45-9708-019B960494DF}">
-              <a14:hiddenLine xmlns:a16="http://schemas.microsoft.com/office/drawing/2014/main" xmlns:a14="http://schemas.microsoft.com/office/drawing/2010/main" xmlns="" w="9525">
+              <a14:hiddenLine xmlns="" xmlns:a14="http://schemas.microsoft.com/office/drawing/2010/main" xmlns:a16="http://schemas.microsoft.com/office/drawing/2014/main" w="9525">
                 <a:solidFill>
                   <a:srgbClr val="000000"/>
                 </a:solidFill>
@@ -25289,7 +25095,7 @@
           <a:effectLst/>
           <a:extLst>
             <a:ext uri="{91240B29-F687-4f45-9708-019B960494DF}">
-              <a14:hiddenLine xmlns:a16="http://schemas.microsoft.com/office/drawing/2014/main" xmlns:p14="http://schemas.microsoft.com/office/powerpoint/2010/main" xmlns:a14="http://schemas.microsoft.com/office/drawing/2010/main" xmlns="" w="9525">
+              <a14:hiddenLine xmlns="" xmlns:a14="http://schemas.microsoft.com/office/drawing/2010/main" xmlns:p14="http://schemas.microsoft.com/office/powerpoint/2010/main" xmlns:a16="http://schemas.microsoft.com/office/drawing/2014/main" w="9525">
                 <a:solidFill>
                   <a:srgbClr val="000000"/>
                 </a:solidFill>
@@ -25658,35 +25464,6 @@
           <a:chExt cx="0" cy="0"/>
         </a:xfrm>
       </p:grpSpPr>
-      <p:sp>
-        <p:nvSpPr>
-          <p:cNvPr id="2" name="Footer Placeholder 1">
-            <a:extLst>
-              <a:ext uri="{FF2B5EF4-FFF2-40B4-BE49-F238E27FC236}">
-                <a16:creationId xmlns:a16="http://schemas.microsoft.com/office/drawing/2014/main" id="{583F0292-5AE0-09AE-2785-35A58EA5D051}"/>
-              </a:ext>
-            </a:extLst>
-          </p:cNvPr>
-          <p:cNvSpPr>
-            <a:spLocks noGrp="1"/>
-          </p:cNvSpPr>
-          <p:nvPr>
-            <p:ph type="ftr" sz="quarter" idx="11"/>
-          </p:nvPr>
-        </p:nvSpPr>
-        <p:spPr/>
-        <p:txBody>
-          <a:bodyPr/>
-          <a:lstStyle/>
-          <a:p>
-            <a:r>
-              <a:rPr lang="en-US"/>
-              <a:t>Presentation title</a:t>
-            </a:r>
-            <a:endParaRPr lang="en-US" dirty="0"/>
-          </a:p>
-        </p:txBody>
-      </p:sp>
       <p:sp>
         <p:nvSpPr>
           <p:cNvPr id="3" name="Slide Number Placeholder 2">
@@ -25806,35 +25583,6 @@
       </p:grpSpPr>
       <p:sp>
         <p:nvSpPr>
-          <p:cNvPr id="2" name="Footer Placeholder 1">
-            <a:extLst>
-              <a:ext uri="{FF2B5EF4-FFF2-40B4-BE49-F238E27FC236}">
-                <a16:creationId xmlns:a16="http://schemas.microsoft.com/office/drawing/2014/main" id="{583F0292-5AE0-09AE-2785-35A58EA5D051}"/>
-              </a:ext>
-            </a:extLst>
-          </p:cNvPr>
-          <p:cNvSpPr>
-            <a:spLocks noGrp="1"/>
-          </p:cNvSpPr>
-          <p:nvPr>
-            <p:ph type="ftr" sz="quarter" idx="11"/>
-          </p:nvPr>
-        </p:nvSpPr>
-        <p:spPr/>
-        <p:txBody>
-          <a:bodyPr/>
-          <a:lstStyle/>
-          <a:p>
-            <a:r>
-              <a:rPr lang="en-US"/>
-              <a:t>Presentation title</a:t>
-            </a:r>
-            <a:endParaRPr lang="en-US" dirty="0"/>
-          </a:p>
-        </p:txBody>
-      </p:sp>
-      <p:sp>
-        <p:nvSpPr>
           <p:cNvPr id="3" name="Slide Number Placeholder 2">
             <a:extLst>
               <a:ext uri="{FF2B5EF4-FFF2-40B4-BE49-F238E27FC236}">
@@ -25951,35 +25699,6 @@
           <a:chExt cx="0" cy="0"/>
         </a:xfrm>
       </p:grpSpPr>
-      <p:sp>
-        <p:nvSpPr>
-          <p:cNvPr id="2" name="Footer Placeholder 1">
-            <a:extLst>
-              <a:ext uri="{FF2B5EF4-FFF2-40B4-BE49-F238E27FC236}">
-                <a16:creationId xmlns:a16="http://schemas.microsoft.com/office/drawing/2014/main" id="{583F0292-5AE0-09AE-2785-35A58EA5D051}"/>
-              </a:ext>
-            </a:extLst>
-          </p:cNvPr>
-          <p:cNvSpPr>
-            <a:spLocks noGrp="1"/>
-          </p:cNvSpPr>
-          <p:nvPr>
-            <p:ph type="ftr" sz="quarter" idx="11"/>
-          </p:nvPr>
-        </p:nvSpPr>
-        <p:spPr/>
-        <p:txBody>
-          <a:bodyPr/>
-          <a:lstStyle/>
-          <a:p>
-            <a:r>
-              <a:rPr lang="en-US"/>
-              <a:t>Presentation title</a:t>
-            </a:r>
-            <a:endParaRPr lang="en-US" dirty="0"/>
-          </a:p>
-        </p:txBody>
-      </p:sp>
       <p:sp>
         <p:nvSpPr>
           <p:cNvPr id="3" name="Slide Number Placeholder 2">
@@ -26605,6 +26324,15 @@
 </file>
 
 <file path=customXml/item2.xml><?xml version="1.0" encoding="utf-8"?>
+<?mso-contentType ?>
+<FormTemplates xmlns="http://schemas.microsoft.com/sharepoint/v3/contenttype/forms">
+  <Display>DocumentLibraryForm</Display>
+  <Edit>DocumentLibraryForm</Edit>
+  <New>DocumentLibraryForm</New>
+</FormTemplates>
+</file>
+
+<file path=customXml/item3.xml><?xml version="1.0" encoding="utf-8"?>
 <ct:contentTypeSchema xmlns:ct="http://schemas.microsoft.com/office/2006/metadata/contentType" xmlns:ma="http://schemas.microsoft.com/office/2006/metadata/properties/metaAttributes" ct:_="" ma:_="" ma:contentTypeName="Document" ma:contentTypeID="0x01010079F111ED35F8CC479449609E8A0923A6" ma:contentTypeVersion="28" ma:contentTypeDescription="Create a new document." ma:contentTypeScope="" ma:versionID="60f5a4f2d2b0abadcf532d48ebf9cb71">
   <xsd:schema xmlns:xsd="http://www.w3.org/2001/XMLSchema" xmlns:xs="http://www.w3.org/2001/XMLSchema" xmlns:p="http://schemas.microsoft.com/office/2006/metadata/properties" xmlns:ns1="http://schemas.microsoft.com/sharepoint/v3" xmlns:ns2="71af3243-3dd4-4a8d-8c0d-dd76da1f02a5" xmlns:ns3="16c05727-aa75-4e4a-9b5f-8a80a1165891" xmlns:ns4="230e9df3-be65-4c73-a93b-d1236ebd677e" targetNamespace="http://schemas.microsoft.com/office/2006/metadata/properties" ma:root="true" ma:fieldsID="7dd78129e6a1811f84807ad11c651531" ns1:_="" ns2:_="" ns3:_="" ns4:_="">
     <xsd:import namespace="http://schemas.microsoft.com/sharepoint/v3"/>
@@ -26916,15 +26644,6 @@
 </ct:contentTypeSchema>
 </file>
 
-<file path=customXml/item3.xml><?xml version="1.0" encoding="utf-8"?>
-<?mso-contentType ?>
-<FormTemplates xmlns="http://schemas.microsoft.com/sharepoint/v3/contenttype/forms">
-  <Display>DocumentLibraryForm</Display>
-  <Edit>DocumentLibraryForm</Edit>
-  <New>DocumentLibraryForm</New>
-</FormTemplates>
-</file>
-
 <file path=customXml/itemProps1.xml><?xml version="1.0" encoding="utf-8"?>
 <ds:datastoreItem xmlns:ds="http://schemas.openxmlformats.org/officeDocument/2006/customXml" ds:itemID="{D235FEF8-1733-4347-95CE-3BB62B2B8DD7}">
   <ds:schemaRefs>
@@ -26938,6 +26657,14 @@
 </file>
 
 <file path=customXml/itemProps2.xml><?xml version="1.0" encoding="utf-8"?>
+<ds:datastoreItem xmlns:ds="http://schemas.openxmlformats.org/officeDocument/2006/customXml" ds:itemID="{69060146-7700-4F6C-986B-89E3839BD4ED}">
+  <ds:schemaRefs>
+    <ds:schemaRef ds:uri="http://schemas.microsoft.com/sharepoint/v3/contenttype/forms"/>
+  </ds:schemaRefs>
+</ds:datastoreItem>
+</file>
+
+<file path=customXml/itemProps3.xml><?xml version="1.0" encoding="utf-8"?>
 <ds:datastoreItem xmlns:ds="http://schemas.openxmlformats.org/officeDocument/2006/customXml" ds:itemID="{08FC98CF-E78A-425D-90FD-55D1C468A34F}">
   <ds:schemaRefs>
     <ds:schemaRef ds:uri="http://schemas.microsoft.com/office/2006/metadata/contentType"/>
@@ -26958,14 +26685,6 @@
 </ds:datastoreItem>
 </file>
 
-<file path=customXml/itemProps3.xml><?xml version="1.0" encoding="utf-8"?>
-<ds:datastoreItem xmlns:ds="http://schemas.openxmlformats.org/officeDocument/2006/customXml" ds:itemID="{69060146-7700-4F6C-986B-89E3839BD4ED}">
-  <ds:schemaRefs>
-    <ds:schemaRef ds:uri="http://schemas.microsoft.com/sharepoint/v3/contenttype/forms"/>
-  </ds:schemaRefs>
-</ds:datastoreItem>
-</file>
-
 <file path=docMetadata/LabelInfo.xml><?xml version="1.0" encoding="utf-8"?>
 <clbl:labelList xmlns:clbl="http://schemas.microsoft.com/office/2020/mipLabelMetadata"/>
 </file>
</xml_diff>